<commit_message>
update remote to match my device ver
</commit_message>
<xml_diff>
--- a/Seminar_Dự_đoán_bất_thường.pptx
+++ b/Seminar_Dự_đoán_bất_thường.pptx
@@ -6,10 +6,10 @@
     <p:sldMasterId id="2147483695" r:id="rId2"/>
   </p:sldMasterIdLst>
   <p:notesMasterIdLst>
-    <p:notesMasterId r:id="rId14"/>
+    <p:notesMasterId r:id="rId17"/>
   </p:notesMasterIdLst>
   <p:handoutMasterIdLst>
-    <p:handoutMasterId r:id="rId15"/>
+    <p:handoutMasterId r:id="rId18"/>
   </p:handoutMasterIdLst>
   <p:sldIdLst>
     <p:sldId id="279" r:id="rId3"/>
@@ -22,7 +22,10 @@
     <p:sldId id="540" r:id="rId10"/>
     <p:sldId id="535" r:id="rId11"/>
     <p:sldId id="536" r:id="rId12"/>
-    <p:sldId id="537" r:id="rId13"/>
+    <p:sldId id="541" r:id="rId13"/>
+    <p:sldId id="542" r:id="rId14"/>
+    <p:sldId id="543" r:id="rId15"/>
+    <p:sldId id="537" r:id="rId16"/>
   </p:sldIdLst>
   <p:sldSz cx="12192000" cy="6858000"/>
   <p:notesSz cx="6858000" cy="9144000"/>
@@ -339,6 +342,9 @@
             <p14:sldId id="540"/>
             <p14:sldId id="535"/>
             <p14:sldId id="536"/>
+            <p14:sldId id="541"/>
+            <p14:sldId id="542"/>
+            <p14:sldId id="543"/>
             <p14:sldId id="537"/>
           </p14:sldIdLst>
         </p14:section>
@@ -375,14 +381,6 @@
     </p:extLst>
   </p:cmAuthor>
 </p:cmAuthorLst>
-</file>
-
-<file path=ppt/revisionInfo.xml><?xml version="1.0" encoding="utf-8"?>
-<p1510:revInfo xmlns:a="http://schemas.openxmlformats.org/drawingml/2006/main" xmlns:r="http://schemas.openxmlformats.org/officeDocument/2006/relationships" xmlns:p1510="http://schemas.microsoft.com/office/powerpoint/2015/10/main">
-  <p1510:revLst>
-    <p1510:client id="{31C5AD9F-10FC-0000-845E-03BEC54B826D}" v="6" dt="2021-02-22T14:35:42.242"/>
-  </p1510:revLst>
-</p1510:revInfo>
 </file>
 
 <file path=ppt/handoutMasters/handoutMaster1.xml><?xml version="1.0" encoding="utf-8"?>
@@ -479,7 +477,7 @@
           <a:p>
             <a:fld id="{D42AFFA7-DF28-4246-96EF-543A1B2B0817}" type="datetimeFigureOut">
               <a:rPr lang="en-US" smtClean="0"/>
-              <a:t>9/29/25</a:t>
+              <a:t>10/1/25</a:t>
             </a:fld>
             <a:endParaRPr lang="en-US"/>
           </a:p>
@@ -2396,6 +2394,204 @@
 </file>
 
 <file path=ppt/notesSlides/notesSlide4.xml><?xml version="1.0" encoding="utf-8"?>
+<p:notes xmlns:a="http://schemas.openxmlformats.org/drawingml/2006/main" xmlns:r="http://schemas.openxmlformats.org/officeDocument/2006/relationships" xmlns:p="http://schemas.openxmlformats.org/presentationml/2006/main">
+  <p:cSld>
+    <p:spTree>
+      <p:nvGrpSpPr>
+        <p:cNvPr id="1" name=""/>
+        <p:cNvGrpSpPr/>
+        <p:nvPr/>
+      </p:nvGrpSpPr>
+      <p:grpSpPr>
+        <a:xfrm>
+          <a:off x="0" y="0"/>
+          <a:ext cx="0" cy="0"/>
+          <a:chOff x="0" y="0"/>
+          <a:chExt cx="0" cy="0"/>
+        </a:xfrm>
+      </p:grpSpPr>
+      <p:sp>
+        <p:nvSpPr>
+          <p:cNvPr id="2" name="Slide Image Placeholder 1"/>
+          <p:cNvSpPr>
+            <a:spLocks noGrp="1" noRot="1" noChangeAspect="1"/>
+          </p:cNvSpPr>
+          <p:nvPr>
+            <p:ph type="sldImg"/>
+          </p:nvPr>
+        </p:nvSpPr>
+        <p:spPr>
+          <a:xfrm>
+            <a:off x="381000" y="685800"/>
+            <a:ext cx="6096000" cy="3429000"/>
+          </a:xfrm>
+        </p:spPr>
+      </p:sp>
+      <p:sp>
+        <p:nvSpPr>
+          <p:cNvPr id="3" name="Notes Placeholder 2"/>
+          <p:cNvSpPr>
+            <a:spLocks noGrp="1"/>
+          </p:cNvSpPr>
+          <p:nvPr>
+            <p:ph type="body" idx="1"/>
+          </p:nvPr>
+        </p:nvSpPr>
+        <p:spPr/>
+        <p:txBody>
+          <a:bodyPr/>
+          <a:lstStyle/>
+          <a:p>
+            <a:endParaRPr lang="en-VN" dirty="0"/>
+          </a:p>
+        </p:txBody>
+      </p:sp>
+    </p:spTree>
+    <p:extLst>
+      <p:ext uri="{BB962C8B-B14F-4D97-AF65-F5344CB8AC3E}">
+        <p14:creationId xmlns:p14="http://schemas.microsoft.com/office/powerpoint/2010/main" val="3968399865"/>
+      </p:ext>
+    </p:extLst>
+  </p:cSld>
+  <p:clrMapOvr>
+    <a:masterClrMapping/>
+  </p:clrMapOvr>
+</p:notes>
+</file>
+
+<file path=ppt/notesSlides/notesSlide5.xml><?xml version="1.0" encoding="utf-8"?>
+<p:notes xmlns:a="http://schemas.openxmlformats.org/drawingml/2006/main" xmlns:r="http://schemas.openxmlformats.org/officeDocument/2006/relationships" xmlns:p="http://schemas.openxmlformats.org/presentationml/2006/main">
+  <p:cSld>
+    <p:spTree>
+      <p:nvGrpSpPr>
+        <p:cNvPr id="1" name=""/>
+        <p:cNvGrpSpPr/>
+        <p:nvPr/>
+      </p:nvGrpSpPr>
+      <p:grpSpPr>
+        <a:xfrm>
+          <a:off x="0" y="0"/>
+          <a:ext cx="0" cy="0"/>
+          <a:chOff x="0" y="0"/>
+          <a:chExt cx="0" cy="0"/>
+        </a:xfrm>
+      </p:grpSpPr>
+      <p:sp>
+        <p:nvSpPr>
+          <p:cNvPr id="2" name="Slide Image Placeholder 1"/>
+          <p:cNvSpPr>
+            <a:spLocks noGrp="1" noRot="1" noChangeAspect="1"/>
+          </p:cNvSpPr>
+          <p:nvPr>
+            <p:ph type="sldImg"/>
+          </p:nvPr>
+        </p:nvSpPr>
+        <p:spPr>
+          <a:xfrm>
+            <a:off x="381000" y="685800"/>
+            <a:ext cx="6096000" cy="3429000"/>
+          </a:xfrm>
+        </p:spPr>
+      </p:sp>
+      <p:sp>
+        <p:nvSpPr>
+          <p:cNvPr id="3" name="Notes Placeholder 2"/>
+          <p:cNvSpPr>
+            <a:spLocks noGrp="1"/>
+          </p:cNvSpPr>
+          <p:nvPr>
+            <p:ph type="body" idx="1"/>
+          </p:nvPr>
+        </p:nvSpPr>
+        <p:spPr/>
+        <p:txBody>
+          <a:bodyPr/>
+          <a:lstStyle/>
+          <a:p>
+            <a:endParaRPr lang="en-VN" dirty="0"/>
+          </a:p>
+        </p:txBody>
+      </p:sp>
+    </p:spTree>
+    <p:extLst>
+      <p:ext uri="{BB962C8B-B14F-4D97-AF65-F5344CB8AC3E}">
+        <p14:creationId xmlns:p14="http://schemas.microsoft.com/office/powerpoint/2010/main" val="2168411478"/>
+      </p:ext>
+    </p:extLst>
+  </p:cSld>
+  <p:clrMapOvr>
+    <a:masterClrMapping/>
+  </p:clrMapOvr>
+</p:notes>
+</file>
+
+<file path=ppt/notesSlides/notesSlide6.xml><?xml version="1.0" encoding="utf-8"?>
+<p:notes xmlns:a="http://schemas.openxmlformats.org/drawingml/2006/main" xmlns:r="http://schemas.openxmlformats.org/officeDocument/2006/relationships" xmlns:p="http://schemas.openxmlformats.org/presentationml/2006/main">
+  <p:cSld>
+    <p:spTree>
+      <p:nvGrpSpPr>
+        <p:cNvPr id="1" name=""/>
+        <p:cNvGrpSpPr/>
+        <p:nvPr/>
+      </p:nvGrpSpPr>
+      <p:grpSpPr>
+        <a:xfrm>
+          <a:off x="0" y="0"/>
+          <a:ext cx="0" cy="0"/>
+          <a:chOff x="0" y="0"/>
+          <a:chExt cx="0" cy="0"/>
+        </a:xfrm>
+      </p:grpSpPr>
+      <p:sp>
+        <p:nvSpPr>
+          <p:cNvPr id="2" name="Slide Image Placeholder 1"/>
+          <p:cNvSpPr>
+            <a:spLocks noGrp="1" noRot="1" noChangeAspect="1"/>
+          </p:cNvSpPr>
+          <p:nvPr>
+            <p:ph type="sldImg"/>
+          </p:nvPr>
+        </p:nvSpPr>
+        <p:spPr>
+          <a:xfrm>
+            <a:off x="381000" y="685800"/>
+            <a:ext cx="6096000" cy="3429000"/>
+          </a:xfrm>
+        </p:spPr>
+      </p:sp>
+      <p:sp>
+        <p:nvSpPr>
+          <p:cNvPr id="3" name="Notes Placeholder 2"/>
+          <p:cNvSpPr>
+            <a:spLocks noGrp="1"/>
+          </p:cNvSpPr>
+          <p:nvPr>
+            <p:ph type="body" idx="1"/>
+          </p:nvPr>
+        </p:nvSpPr>
+        <p:spPr/>
+        <p:txBody>
+          <a:bodyPr/>
+          <a:lstStyle/>
+          <a:p>
+            <a:endParaRPr lang="en-VN" dirty="0"/>
+          </a:p>
+        </p:txBody>
+      </p:sp>
+    </p:spTree>
+    <p:extLst>
+      <p:ext uri="{BB962C8B-B14F-4D97-AF65-F5344CB8AC3E}">
+        <p14:creationId xmlns:p14="http://schemas.microsoft.com/office/powerpoint/2010/main" val="3701931365"/>
+      </p:ext>
+    </p:extLst>
+  </p:cSld>
+  <p:clrMapOvr>
+    <a:masterClrMapping/>
+  </p:clrMapOvr>
+</p:notes>
+</file>
+
+<file path=ppt/notesSlides/notesSlide7.xml><?xml version="1.0" encoding="utf-8"?>
 <p:notes xmlns:a="http://schemas.openxmlformats.org/drawingml/2006/main" xmlns:r="http://schemas.openxmlformats.org/officeDocument/2006/relationships" xmlns:p="http://schemas.openxmlformats.org/presentationml/2006/main">
   <p:cSld>
     <p:spTree>
@@ -3061,7 +3257,7 @@
           <a:p>
             <a:fld id="{D4AC0E09-8C28-43E2-BBC6-E2581F1B4356}" type="datetimeFigureOut">
               <a:rPr lang="en-US" smtClean="0"/>
-              <a:t>9/29/25</a:t>
+              <a:t>10/1/25</a:t>
             </a:fld>
             <a:endParaRPr lang="en-US"/>
           </a:p>
@@ -3178,7 +3374,7 @@
           <a:p>
             <a:fld id="{D4AC0E09-8C28-43E2-BBC6-E2581F1B4356}" type="datetimeFigureOut">
               <a:rPr lang="en-US" smtClean="0"/>
-              <a:t>9/29/25</a:t>
+              <a:t>10/1/25</a:t>
             </a:fld>
             <a:endParaRPr lang="en-US"/>
           </a:p>
@@ -3273,7 +3469,7 @@
           <a:p>
             <a:fld id="{D4AC0E09-8C28-43E2-BBC6-E2581F1B4356}" type="datetimeFigureOut">
               <a:rPr lang="en-US" smtClean="0"/>
-              <a:t>9/29/25</a:t>
+              <a:t>10/1/25</a:t>
             </a:fld>
             <a:endParaRPr lang="en-US"/>
           </a:p>
@@ -3548,7 +3744,7 @@
           <a:p>
             <a:fld id="{D4AC0E09-8C28-43E2-BBC6-E2581F1B4356}" type="datetimeFigureOut">
               <a:rPr lang="en-US" smtClean="0"/>
-              <a:t>9/29/25</a:t>
+              <a:t>10/1/25</a:t>
             </a:fld>
             <a:endParaRPr lang="en-US"/>
           </a:p>
@@ -3800,7 +3996,7 @@
           <a:p>
             <a:fld id="{D4AC0E09-8C28-43E2-BBC6-E2581F1B4356}" type="datetimeFigureOut">
               <a:rPr lang="en-US" smtClean="0"/>
-              <a:t>9/29/25</a:t>
+              <a:t>10/1/25</a:t>
             </a:fld>
             <a:endParaRPr lang="en-US"/>
           </a:p>
@@ -3968,7 +4164,7 @@
           <a:p>
             <a:fld id="{D4AC0E09-8C28-43E2-BBC6-E2581F1B4356}" type="datetimeFigureOut">
               <a:rPr lang="en-US" smtClean="0"/>
-              <a:t>9/29/25</a:t>
+              <a:t>10/1/25</a:t>
             </a:fld>
             <a:endParaRPr lang="en-US"/>
           </a:p>
@@ -4146,7 +4342,7 @@
           <a:p>
             <a:fld id="{D4AC0E09-8C28-43E2-BBC6-E2581F1B4356}" type="datetimeFigureOut">
               <a:rPr lang="en-US" smtClean="0"/>
-              <a:t>9/29/25</a:t>
+              <a:t>10/1/25</a:t>
             </a:fld>
             <a:endParaRPr lang="en-US"/>
           </a:p>
@@ -6648,7 +6844,7 @@
           </a:ln>
           <a:extLst>
             <a:ext uri="{C572A759-6A51-4108-AA02-DFA0A04FC94B}">
-              <ma14:wrappingTextBoxFlag xmlns="" xmlns:ma14="http://schemas.microsoft.com/office/mac/drawingml/2011/main" xmlns:a14="http://schemas.microsoft.com/office/drawing/2010/main" xmlns:m="http://schemas.openxmlformats.org/officeDocument/2006/math" val="1"/>
+              <ma14:wrappingTextBoxFlag xmlns:m="http://schemas.openxmlformats.org/officeDocument/2006/math" xmlns:a14="http://schemas.microsoft.com/office/drawing/2010/main" xmlns:ma14="http://schemas.microsoft.com/office/mac/drawingml/2011/main" xmlns="" val="1"/>
             </a:ext>
           </a:extLst>
         </p:spPr>
@@ -11103,7 +11299,7 @@
           </a:ln>
           <a:extLst>
             <a:ext uri="{C572A759-6A51-4108-AA02-DFA0A04FC94B}">
-              <ma14:wrappingTextBoxFlag xmlns="" xmlns:ma14="http://schemas.microsoft.com/office/mac/drawingml/2011/main" xmlns:a14="http://schemas.microsoft.com/office/drawing/2010/main" xmlns:m="http://schemas.openxmlformats.org/officeDocument/2006/math" val="1"/>
+              <ma14:wrappingTextBoxFlag xmlns:m="http://schemas.openxmlformats.org/officeDocument/2006/math" xmlns:a14="http://schemas.microsoft.com/office/drawing/2010/main" xmlns:ma14="http://schemas.microsoft.com/office/mac/drawingml/2011/main" xmlns="" val="1"/>
             </a:ext>
           </a:extLst>
         </p:spPr>
@@ -11481,7 +11677,7 @@
           </a:ln>
           <a:extLst>
             <a:ext uri="{C572A759-6A51-4108-AA02-DFA0A04FC94B}">
-              <ma14:wrappingTextBoxFlag xmlns="" xmlns:ma14="http://schemas.microsoft.com/office/mac/drawingml/2011/main" xmlns:a14="http://schemas.microsoft.com/office/drawing/2010/main" xmlns:m="http://schemas.openxmlformats.org/officeDocument/2006/math" val="1"/>
+              <ma14:wrappingTextBoxFlag xmlns:m="http://schemas.openxmlformats.org/officeDocument/2006/math" xmlns:a14="http://schemas.microsoft.com/office/drawing/2010/main" xmlns:ma14="http://schemas.microsoft.com/office/mac/drawingml/2011/main" xmlns="" val="1"/>
             </a:ext>
           </a:extLst>
         </p:spPr>
@@ -11920,7 +12116,7 @@
           <a:p>
             <a:fld id="{D4AC0E09-8C28-43E2-BBC6-E2581F1B4356}" type="datetimeFigureOut">
               <a:rPr lang="en-US" smtClean="0"/>
-              <a:t>9/29/25</a:t>
+              <a:t>10/1/25</a:t>
             </a:fld>
             <a:endParaRPr lang="en-US"/>
           </a:p>
@@ -12068,7 +12264,7 @@
           </a:ln>
           <a:extLst>
             <a:ext uri="{C572A759-6A51-4108-AA02-DFA0A04FC94B}">
-              <ma14:wrappingTextBoxFlag xmlns="" xmlns:ma14="http://schemas.microsoft.com/office/mac/drawingml/2011/main" xmlns:a14="http://schemas.microsoft.com/office/drawing/2010/main" xmlns:m="http://schemas.openxmlformats.org/officeDocument/2006/math" val="1"/>
+              <ma14:wrappingTextBoxFlag xmlns:m="http://schemas.openxmlformats.org/officeDocument/2006/math" xmlns:a14="http://schemas.microsoft.com/office/drawing/2010/main" xmlns:ma14="http://schemas.microsoft.com/office/mac/drawingml/2011/main" xmlns="" val="1"/>
             </a:ext>
           </a:extLst>
         </p:spPr>
@@ -12257,7 +12453,7 @@
           <a:p>
             <a:fld id="{E0928FF4-786A-4620-AFA0-68722E23DA0F}" type="datetimeFigureOut">
               <a:rPr lang="en-US" smtClean="0"/>
-              <a:t>9/29/25</a:t>
+              <a:t>10/1/25</a:t>
             </a:fld>
             <a:endParaRPr lang="en-US"/>
           </a:p>
@@ -12524,7 +12720,7 @@
           <a:p>
             <a:fld id="{E0928FF4-786A-4620-AFA0-68722E23DA0F}" type="datetimeFigureOut">
               <a:rPr lang="en-US" smtClean="0"/>
-              <a:t>9/29/25</a:t>
+              <a:t>10/1/25</a:t>
             </a:fld>
             <a:endParaRPr lang="en-US"/>
           </a:p>
@@ -14356,7 +14552,7 @@
           </a:ln>
           <a:extLst>
             <a:ext uri="{C572A759-6A51-4108-AA02-DFA0A04FC94B}">
-              <ma14:wrappingTextBoxFlag xmlns="" xmlns:ma14="http://schemas.microsoft.com/office/mac/drawingml/2011/main" xmlns:a14="http://schemas.microsoft.com/office/drawing/2010/main" xmlns:m="http://schemas.openxmlformats.org/officeDocument/2006/math" val="1"/>
+              <ma14:wrappingTextBoxFlag xmlns:m="http://schemas.openxmlformats.org/officeDocument/2006/math" xmlns:a14="http://schemas.microsoft.com/office/drawing/2010/main" xmlns:ma14="http://schemas.microsoft.com/office/mac/drawingml/2011/main" xmlns="" val="1"/>
             </a:ext>
           </a:extLst>
         </p:spPr>
@@ -18850,7 +19046,7 @@
           <a:p>
             <a:fld id="{D4AC0E09-8C28-43E2-BBC6-E2581F1B4356}" type="datetimeFigureOut">
               <a:rPr lang="en-US" smtClean="0"/>
-              <a:t>9/29/25</a:t>
+              <a:t>10/1/25</a:t>
             </a:fld>
             <a:endParaRPr lang="en-US"/>
           </a:p>
@@ -19079,7 +19275,7 @@
           <a:p>
             <a:fld id="{D4AC0E09-8C28-43E2-BBC6-E2581F1B4356}" type="datetimeFigureOut">
               <a:rPr lang="en-US" smtClean="0"/>
-              <a:t>9/29/25</a:t>
+              <a:t>10/1/25</a:t>
             </a:fld>
             <a:endParaRPr lang="en-US"/>
           </a:p>
@@ -19203,7 +19399,7 @@
           <a:p>
             <a:fld id="{D4AC0E09-8C28-43E2-BBC6-E2581F1B4356}" type="datetimeFigureOut">
               <a:rPr lang="en-US" smtClean="0"/>
-              <a:t>9/29/25</a:t>
+              <a:t>10/1/25</a:t>
             </a:fld>
             <a:endParaRPr lang="en-US"/>
           </a:p>
@@ -19813,7 +20009,7 @@
           <a:p>
             <a:fld id="{D4AC0E09-8C28-43E2-BBC6-E2581F1B4356}" type="datetimeFigureOut">
               <a:rPr lang="en-US" smtClean="0"/>
-              <a:t>9/29/25</a:t>
+              <a:t>10/1/25</a:t>
             </a:fld>
             <a:endParaRPr lang="en-US"/>
           </a:p>
@@ -20618,7 +20814,7 @@
           </a:ln>
           <a:extLst>
             <a:ext uri="{C572A759-6A51-4108-AA02-DFA0A04FC94B}">
-              <ma14:wrappingTextBoxFlag xmlns="" xmlns:ma14="http://schemas.microsoft.com/office/mac/drawingml/2011/main" xmlns:a14="http://schemas.microsoft.com/office/drawing/2010/main" xmlns:m="http://schemas.openxmlformats.org/officeDocument/2006/math" val="1"/>
+              <ma14:wrappingTextBoxFlag xmlns:m="http://schemas.openxmlformats.org/officeDocument/2006/math" xmlns:a14="http://schemas.microsoft.com/office/drawing/2010/main" xmlns:ma14="http://schemas.microsoft.com/office/mac/drawingml/2011/main" xmlns="" val="1"/>
             </a:ext>
           </a:extLst>
         </p:spPr>
@@ -20896,6 +21092,600 @@
 </file>
 
 <file path=ppt/slides/slide11.xml><?xml version="1.0" encoding="utf-8"?>
+<p:sld xmlns:a="http://schemas.openxmlformats.org/drawingml/2006/main" xmlns:r="http://schemas.openxmlformats.org/officeDocument/2006/relationships" xmlns:p="http://schemas.openxmlformats.org/presentationml/2006/main">
+  <p:cSld>
+    <p:spTree>
+      <p:nvGrpSpPr>
+        <p:cNvPr id="1" name=""/>
+        <p:cNvGrpSpPr/>
+        <p:nvPr/>
+      </p:nvGrpSpPr>
+      <p:grpSpPr>
+        <a:xfrm>
+          <a:off x="0" y="0"/>
+          <a:ext cx="0" cy="0"/>
+          <a:chOff x="0" y="0"/>
+          <a:chExt cx="0" cy="0"/>
+        </a:xfrm>
+      </p:grpSpPr>
+      <p:sp>
+        <p:nvSpPr>
+          <p:cNvPr id="2" name="Title 1"/>
+          <p:cNvSpPr>
+            <a:spLocks noGrp="1"/>
+          </p:cNvSpPr>
+          <p:nvPr>
+            <p:ph type="title"/>
+          </p:nvPr>
+        </p:nvSpPr>
+        <p:spPr/>
+        <p:txBody>
+          <a:bodyPr>
+            <a:normAutofit fontScale="90000"/>
+          </a:bodyPr>
+          <a:lstStyle/>
+          <a:p>
+            <a:r>
+              <a:rPr lang="en-US" dirty="0" err="1"/>
+              <a:t>Phát</a:t>
+            </a:r>
+            <a:r>
+              <a:rPr lang="en-US" dirty="0"/>
+              <a:t> </a:t>
+            </a:r>
+            <a:r>
+              <a:rPr lang="en-US" dirty="0" err="1"/>
+              <a:t>hiện</a:t>
+            </a:r>
+            <a:r>
+              <a:rPr lang="en-US" dirty="0"/>
+              <a:t> </a:t>
+            </a:r>
+            <a:r>
+              <a:rPr lang="en-US" dirty="0" err="1"/>
+              <a:t>bất</a:t>
+            </a:r>
+            <a:r>
+              <a:rPr lang="en-US" dirty="0"/>
+              <a:t> </a:t>
+            </a:r>
+            <a:r>
+              <a:rPr lang="en-US" dirty="0" err="1"/>
+              <a:t>thường</a:t>
+            </a:r>
+            <a:endParaRPr lang="en-US" dirty="0"/>
+          </a:p>
+        </p:txBody>
+      </p:sp>
+      <p:sp>
+        <p:nvSpPr>
+          <p:cNvPr id="3" name="Text Placeholder 2"/>
+          <p:cNvSpPr>
+            <a:spLocks noGrp="1"/>
+          </p:cNvSpPr>
+          <p:nvPr>
+            <p:ph type="body" sz="quarter" idx="13"/>
+          </p:nvPr>
+        </p:nvSpPr>
+        <p:spPr/>
+        <p:txBody>
+          <a:bodyPr/>
+          <a:lstStyle/>
+          <a:p>
+            <a:r>
+              <a:rPr lang="en-US" dirty="0" err="1"/>
+              <a:t>Kết</a:t>
+            </a:r>
+            <a:r>
+              <a:rPr lang="en-US" dirty="0"/>
+              <a:t> </a:t>
+            </a:r>
+            <a:r>
+              <a:rPr lang="en-US" dirty="0" err="1"/>
+              <a:t>quả</a:t>
+            </a:r>
+            <a:r>
+              <a:rPr lang="en-US" dirty="0"/>
+              <a:t> </a:t>
+            </a:r>
+            <a:r>
+              <a:rPr lang="en-US" dirty="0" err="1"/>
+              <a:t>thực</a:t>
+            </a:r>
+            <a:r>
+              <a:rPr lang="en-US" dirty="0"/>
+              <a:t> </a:t>
+            </a:r>
+            <a:r>
+              <a:rPr lang="en-US" dirty="0" err="1"/>
+              <a:t>nghiệm</a:t>
+            </a:r>
+            <a:endParaRPr lang="en-US" dirty="0"/>
+          </a:p>
+        </p:txBody>
+      </p:sp>
+      <p:sp>
+        <p:nvSpPr>
+          <p:cNvPr id="4" name="Text Placeholder 3"/>
+          <p:cNvSpPr>
+            <a:spLocks noGrp="1"/>
+          </p:cNvSpPr>
+          <p:nvPr>
+            <p:ph type="body" sz="quarter" idx="14"/>
+          </p:nvPr>
+        </p:nvSpPr>
+        <p:spPr/>
+        <p:txBody>
+          <a:bodyPr/>
+          <a:lstStyle/>
+          <a:p>
+            <a:r>
+              <a:rPr lang="en-US" dirty="0"/>
+              <a:t>5</a:t>
+            </a:r>
+          </a:p>
+        </p:txBody>
+      </p:sp>
+      <p:pic>
+        <p:nvPicPr>
+          <p:cNvPr id="5" name="Picture 4">
+            <a:extLst>
+              <a:ext uri="{FF2B5EF4-FFF2-40B4-BE49-F238E27FC236}">
+                <a16:creationId xmlns:a16="http://schemas.microsoft.com/office/drawing/2014/main" id="{53696A37-7757-E428-4309-5414DEAEFFE7}"/>
+              </a:ext>
+            </a:extLst>
+          </p:cNvPr>
+          <p:cNvPicPr>
+            <a:picLocks noChangeAspect="1"/>
+          </p:cNvPicPr>
+          <p:nvPr/>
+        </p:nvPicPr>
+        <p:blipFill>
+          <a:blip r:embed="rId3"/>
+          <a:stretch>
+            <a:fillRect/>
+          </a:stretch>
+        </p:blipFill>
+        <p:spPr>
+          <a:xfrm>
+            <a:off x="842887" y="2058656"/>
+            <a:ext cx="10434713" cy="3726683"/>
+          </a:xfrm>
+          <a:prstGeom prst="rect">
+            <a:avLst/>
+          </a:prstGeom>
+        </p:spPr>
+      </p:pic>
+    </p:spTree>
+    <p:extLst>
+      <p:ext uri="{BB962C8B-B14F-4D97-AF65-F5344CB8AC3E}">
+        <p14:creationId xmlns:p14="http://schemas.microsoft.com/office/powerpoint/2010/main" val="328580660"/>
+      </p:ext>
+    </p:extLst>
+  </p:cSld>
+  <p:clrMapOvr>
+    <a:masterClrMapping/>
+  </p:clrMapOvr>
+</p:sld>
+</file>
+
+<file path=ppt/slides/slide12.xml><?xml version="1.0" encoding="utf-8"?>
+<p:sld xmlns:a="http://schemas.openxmlformats.org/drawingml/2006/main" xmlns:r="http://schemas.openxmlformats.org/officeDocument/2006/relationships" xmlns:p="http://schemas.openxmlformats.org/presentationml/2006/main">
+  <p:cSld>
+    <p:spTree>
+      <p:nvGrpSpPr>
+        <p:cNvPr id="1" name=""/>
+        <p:cNvGrpSpPr/>
+        <p:nvPr/>
+      </p:nvGrpSpPr>
+      <p:grpSpPr>
+        <a:xfrm>
+          <a:off x="0" y="0"/>
+          <a:ext cx="0" cy="0"/>
+          <a:chOff x="0" y="0"/>
+          <a:chExt cx="0" cy="0"/>
+        </a:xfrm>
+      </p:grpSpPr>
+      <p:sp>
+        <p:nvSpPr>
+          <p:cNvPr id="2" name="Title 1"/>
+          <p:cNvSpPr>
+            <a:spLocks noGrp="1"/>
+          </p:cNvSpPr>
+          <p:nvPr>
+            <p:ph type="title"/>
+          </p:nvPr>
+        </p:nvSpPr>
+        <p:spPr/>
+        <p:txBody>
+          <a:bodyPr>
+            <a:normAutofit fontScale="90000"/>
+          </a:bodyPr>
+          <a:lstStyle/>
+          <a:p>
+            <a:r>
+              <a:rPr lang="en-US" dirty="0" err="1"/>
+              <a:t>Phát</a:t>
+            </a:r>
+            <a:r>
+              <a:rPr lang="en-US" dirty="0"/>
+              <a:t> </a:t>
+            </a:r>
+            <a:r>
+              <a:rPr lang="en-US" dirty="0" err="1"/>
+              <a:t>hiện</a:t>
+            </a:r>
+            <a:r>
+              <a:rPr lang="en-US" dirty="0"/>
+              <a:t> </a:t>
+            </a:r>
+            <a:r>
+              <a:rPr lang="en-US" dirty="0" err="1"/>
+              <a:t>bất</a:t>
+            </a:r>
+            <a:r>
+              <a:rPr lang="en-US" dirty="0"/>
+              <a:t> </a:t>
+            </a:r>
+            <a:r>
+              <a:rPr lang="en-US" dirty="0" err="1"/>
+              <a:t>thường</a:t>
+            </a:r>
+            <a:endParaRPr lang="en-US" dirty="0"/>
+          </a:p>
+        </p:txBody>
+      </p:sp>
+      <p:sp>
+        <p:nvSpPr>
+          <p:cNvPr id="3" name="Text Placeholder 2"/>
+          <p:cNvSpPr>
+            <a:spLocks noGrp="1"/>
+          </p:cNvSpPr>
+          <p:nvPr>
+            <p:ph type="body" sz="quarter" idx="13"/>
+          </p:nvPr>
+        </p:nvSpPr>
+        <p:spPr/>
+        <p:txBody>
+          <a:bodyPr/>
+          <a:lstStyle/>
+          <a:p>
+            <a:r>
+              <a:rPr lang="en-US" dirty="0" err="1"/>
+              <a:t>Kết</a:t>
+            </a:r>
+            <a:r>
+              <a:rPr lang="en-US" dirty="0"/>
+              <a:t> </a:t>
+            </a:r>
+            <a:r>
+              <a:rPr lang="en-US" dirty="0" err="1"/>
+              <a:t>quả</a:t>
+            </a:r>
+            <a:r>
+              <a:rPr lang="en-US" dirty="0"/>
+              <a:t> </a:t>
+            </a:r>
+            <a:r>
+              <a:rPr lang="en-US" dirty="0" err="1"/>
+              <a:t>thực</a:t>
+            </a:r>
+            <a:r>
+              <a:rPr lang="en-US" dirty="0"/>
+              <a:t> </a:t>
+            </a:r>
+            <a:r>
+              <a:rPr lang="en-US" dirty="0" err="1"/>
+              <a:t>nghiệm</a:t>
+            </a:r>
+            <a:endParaRPr lang="en-US" dirty="0"/>
+          </a:p>
+        </p:txBody>
+      </p:sp>
+      <p:sp>
+        <p:nvSpPr>
+          <p:cNvPr id="4" name="Text Placeholder 3"/>
+          <p:cNvSpPr>
+            <a:spLocks noGrp="1"/>
+          </p:cNvSpPr>
+          <p:nvPr>
+            <p:ph type="body" sz="quarter" idx="14"/>
+          </p:nvPr>
+        </p:nvSpPr>
+        <p:spPr/>
+        <p:txBody>
+          <a:bodyPr/>
+          <a:lstStyle/>
+          <a:p>
+            <a:r>
+              <a:rPr lang="en-US" dirty="0"/>
+              <a:t>5</a:t>
+            </a:r>
+          </a:p>
+        </p:txBody>
+      </p:sp>
+      <p:pic>
+        <p:nvPicPr>
+          <p:cNvPr id="5" name="Picture 4">
+            <a:extLst>
+              <a:ext uri="{FF2B5EF4-FFF2-40B4-BE49-F238E27FC236}">
+                <a16:creationId xmlns:a16="http://schemas.microsoft.com/office/drawing/2014/main" id="{53696A37-7757-E428-4309-5414DEAEFFE7}"/>
+              </a:ext>
+            </a:extLst>
+          </p:cNvPr>
+          <p:cNvPicPr>
+            <a:picLocks noChangeAspect="1"/>
+          </p:cNvPicPr>
+          <p:nvPr/>
+        </p:nvPicPr>
+        <p:blipFill>
+          <a:blip r:embed="rId3"/>
+          <a:stretch>
+            <a:fillRect/>
+          </a:stretch>
+        </p:blipFill>
+        <p:spPr>
+          <a:xfrm>
+            <a:off x="842887" y="2058656"/>
+            <a:ext cx="10434713" cy="3726683"/>
+          </a:xfrm>
+          <a:prstGeom prst="rect">
+            <a:avLst/>
+          </a:prstGeom>
+        </p:spPr>
+      </p:pic>
+      <p:pic>
+        <p:nvPicPr>
+          <p:cNvPr id="7" name="Picture 6">
+            <a:extLst>
+              <a:ext uri="{FF2B5EF4-FFF2-40B4-BE49-F238E27FC236}">
+                <a16:creationId xmlns:a16="http://schemas.microsoft.com/office/drawing/2014/main" id="{B121CC99-3D7F-314E-6AE6-2B7065837396}"/>
+              </a:ext>
+            </a:extLst>
+          </p:cNvPr>
+          <p:cNvPicPr>
+            <a:picLocks noChangeAspect="1"/>
+          </p:cNvPicPr>
+          <p:nvPr/>
+        </p:nvPicPr>
+        <p:blipFill>
+          <a:blip r:embed="rId4"/>
+          <a:stretch>
+            <a:fillRect/>
+          </a:stretch>
+        </p:blipFill>
+        <p:spPr>
+          <a:xfrm>
+            <a:off x="842886" y="2058656"/>
+            <a:ext cx="10434713" cy="3726683"/>
+          </a:xfrm>
+          <a:prstGeom prst="rect">
+            <a:avLst/>
+          </a:prstGeom>
+        </p:spPr>
+      </p:pic>
+    </p:spTree>
+    <p:extLst>
+      <p:ext uri="{BB962C8B-B14F-4D97-AF65-F5344CB8AC3E}">
+        <p14:creationId xmlns:p14="http://schemas.microsoft.com/office/powerpoint/2010/main" val="1485812965"/>
+      </p:ext>
+    </p:extLst>
+  </p:cSld>
+  <p:clrMapOvr>
+    <a:masterClrMapping/>
+  </p:clrMapOvr>
+</p:sld>
+</file>
+
+<file path=ppt/slides/slide13.xml><?xml version="1.0" encoding="utf-8"?>
+<p:sld xmlns:a="http://schemas.openxmlformats.org/drawingml/2006/main" xmlns:r="http://schemas.openxmlformats.org/officeDocument/2006/relationships" xmlns:p="http://schemas.openxmlformats.org/presentationml/2006/main">
+  <p:cSld>
+    <p:spTree>
+      <p:nvGrpSpPr>
+        <p:cNvPr id="1" name=""/>
+        <p:cNvGrpSpPr/>
+        <p:nvPr/>
+      </p:nvGrpSpPr>
+      <p:grpSpPr>
+        <a:xfrm>
+          <a:off x="0" y="0"/>
+          <a:ext cx="0" cy="0"/>
+          <a:chOff x="0" y="0"/>
+          <a:chExt cx="0" cy="0"/>
+        </a:xfrm>
+      </p:grpSpPr>
+      <p:sp>
+        <p:nvSpPr>
+          <p:cNvPr id="2" name="Title 1"/>
+          <p:cNvSpPr>
+            <a:spLocks noGrp="1"/>
+          </p:cNvSpPr>
+          <p:nvPr>
+            <p:ph type="title"/>
+          </p:nvPr>
+        </p:nvSpPr>
+        <p:spPr/>
+        <p:txBody>
+          <a:bodyPr>
+            <a:normAutofit fontScale="90000"/>
+          </a:bodyPr>
+          <a:lstStyle/>
+          <a:p>
+            <a:r>
+              <a:rPr lang="en-US" dirty="0" err="1"/>
+              <a:t>Phát</a:t>
+            </a:r>
+            <a:r>
+              <a:rPr lang="en-US" dirty="0"/>
+              <a:t> </a:t>
+            </a:r>
+            <a:r>
+              <a:rPr lang="en-US" dirty="0" err="1"/>
+              <a:t>hiện</a:t>
+            </a:r>
+            <a:r>
+              <a:rPr lang="en-US" dirty="0"/>
+              <a:t> </a:t>
+            </a:r>
+            <a:r>
+              <a:rPr lang="en-US" dirty="0" err="1"/>
+              <a:t>bất</a:t>
+            </a:r>
+            <a:r>
+              <a:rPr lang="en-US" dirty="0"/>
+              <a:t> </a:t>
+            </a:r>
+            <a:r>
+              <a:rPr lang="en-US" dirty="0" err="1"/>
+              <a:t>thường</a:t>
+            </a:r>
+            <a:endParaRPr lang="en-US" dirty="0"/>
+          </a:p>
+        </p:txBody>
+      </p:sp>
+      <p:sp>
+        <p:nvSpPr>
+          <p:cNvPr id="3" name="Text Placeholder 2"/>
+          <p:cNvSpPr>
+            <a:spLocks noGrp="1"/>
+          </p:cNvSpPr>
+          <p:nvPr>
+            <p:ph type="body" sz="quarter" idx="13"/>
+          </p:nvPr>
+        </p:nvSpPr>
+        <p:spPr/>
+        <p:txBody>
+          <a:bodyPr/>
+          <a:lstStyle/>
+          <a:p>
+            <a:r>
+              <a:rPr lang="en-US" dirty="0" err="1"/>
+              <a:t>Kết</a:t>
+            </a:r>
+            <a:r>
+              <a:rPr lang="en-US" dirty="0"/>
+              <a:t> </a:t>
+            </a:r>
+            <a:r>
+              <a:rPr lang="en-US" dirty="0" err="1"/>
+              <a:t>quả</a:t>
+            </a:r>
+            <a:r>
+              <a:rPr lang="en-US" dirty="0"/>
+              <a:t> </a:t>
+            </a:r>
+            <a:r>
+              <a:rPr lang="en-US" dirty="0" err="1"/>
+              <a:t>thực</a:t>
+            </a:r>
+            <a:r>
+              <a:rPr lang="en-US" dirty="0"/>
+              <a:t> </a:t>
+            </a:r>
+            <a:r>
+              <a:rPr lang="en-US" dirty="0" err="1"/>
+              <a:t>nghiệm</a:t>
+            </a:r>
+            <a:endParaRPr lang="en-US" dirty="0"/>
+          </a:p>
+        </p:txBody>
+      </p:sp>
+      <p:sp>
+        <p:nvSpPr>
+          <p:cNvPr id="4" name="Text Placeholder 3"/>
+          <p:cNvSpPr>
+            <a:spLocks noGrp="1"/>
+          </p:cNvSpPr>
+          <p:nvPr>
+            <p:ph type="body" sz="quarter" idx="14"/>
+          </p:nvPr>
+        </p:nvSpPr>
+        <p:spPr/>
+        <p:txBody>
+          <a:bodyPr/>
+          <a:lstStyle/>
+          <a:p>
+            <a:r>
+              <a:rPr lang="en-US" dirty="0"/>
+              <a:t>5</a:t>
+            </a:r>
+          </a:p>
+        </p:txBody>
+      </p:sp>
+      <p:pic>
+        <p:nvPicPr>
+          <p:cNvPr id="5" name="Picture 4">
+            <a:extLst>
+              <a:ext uri="{FF2B5EF4-FFF2-40B4-BE49-F238E27FC236}">
+                <a16:creationId xmlns:a16="http://schemas.microsoft.com/office/drawing/2014/main" id="{53696A37-7757-E428-4309-5414DEAEFFE7}"/>
+              </a:ext>
+            </a:extLst>
+          </p:cNvPr>
+          <p:cNvPicPr>
+            <a:picLocks noChangeAspect="1"/>
+          </p:cNvPicPr>
+          <p:nvPr/>
+        </p:nvPicPr>
+        <p:blipFill>
+          <a:blip r:embed="rId3"/>
+          <a:stretch>
+            <a:fillRect/>
+          </a:stretch>
+        </p:blipFill>
+        <p:spPr>
+          <a:xfrm>
+            <a:off x="842887" y="2058656"/>
+            <a:ext cx="10434713" cy="3726683"/>
+          </a:xfrm>
+          <a:prstGeom prst="rect">
+            <a:avLst/>
+          </a:prstGeom>
+        </p:spPr>
+      </p:pic>
+      <p:pic>
+        <p:nvPicPr>
+          <p:cNvPr id="6" name="Picture 5">
+            <a:extLst>
+              <a:ext uri="{FF2B5EF4-FFF2-40B4-BE49-F238E27FC236}">
+                <a16:creationId xmlns:a16="http://schemas.microsoft.com/office/drawing/2014/main" id="{1434BBDC-0E4B-814F-25C1-9705D9DEF303}"/>
+              </a:ext>
+            </a:extLst>
+          </p:cNvPr>
+          <p:cNvPicPr>
+            <a:picLocks noChangeAspect="1"/>
+          </p:cNvPicPr>
+          <p:nvPr/>
+        </p:nvPicPr>
+        <p:blipFill>
+          <a:blip r:embed="rId4"/>
+          <a:stretch>
+            <a:fillRect/>
+          </a:stretch>
+        </p:blipFill>
+        <p:spPr>
+          <a:xfrm>
+            <a:off x="842887" y="2058656"/>
+            <a:ext cx="10506226" cy="3752223"/>
+          </a:xfrm>
+          <a:prstGeom prst="rect">
+            <a:avLst/>
+          </a:prstGeom>
+        </p:spPr>
+      </p:pic>
+    </p:spTree>
+    <p:extLst>
+      <p:ext uri="{BB962C8B-B14F-4D97-AF65-F5344CB8AC3E}">
+        <p14:creationId xmlns:p14="http://schemas.microsoft.com/office/powerpoint/2010/main" val="2467609825"/>
+      </p:ext>
+    </p:extLst>
+  </p:cSld>
+  <p:clrMapOvr>
+    <a:masterClrMapping/>
+  </p:clrMapOvr>
+</p:sld>
+</file>
+
+<file path=ppt/slides/slide14.xml><?xml version="1.0" encoding="utf-8"?>
 <p:sld xmlns:a="http://schemas.openxmlformats.org/drawingml/2006/main" xmlns:r="http://schemas.openxmlformats.org/officeDocument/2006/relationships" xmlns:p="http://schemas.openxmlformats.org/presentationml/2006/main">
   <p:cSld>
     <p:spTree>

</xml_diff>